<commit_message>
Moved talks to unchainlife
</commit_message>
<xml_diff>
--- a/by-your-command/by-your-command.pptx
+++ b/by-your-command/by-your-command.pptx
@@ -3132,7 +3132,10 @@
               </a:defRPr>
             </a:pPr>
             <a:r>
-              <a:t>github.com/nomad3k</a:t>
+              <a:rPr u="sng">
+                <a:hlinkClick r:id="rId4" invalidUrl="" action="" tgtFrame="" tooltip="" history="1" highlightClick="0" endSnd="0"/>
+              </a:rPr>
+              <a:t>github.com/unchainlife/talks</a:t>
             </a:r>
           </a:p>
         </p:txBody>
@@ -3140,35 +3143,6 @@
       <p:pic>
         <p:nvPicPr>
           <p:cNvPr id="122" name="pasted-image.pdf"/>
-          <p:cNvPicPr>
-            <a:picLocks noChangeAspect="1"/>
-          </p:cNvPicPr>
-          <p:nvPr/>
-        </p:nvPicPr>
-        <p:blipFill>
-          <a:blip r:embed="rId4">
-            <a:extLst/>
-          </a:blip>
-          <a:stretch>
-            <a:fillRect/>
-          </a:stretch>
-        </p:blipFill>
-        <p:spPr>
-          <a:xfrm>
-            <a:off x="0" y="9036755"/>
-            <a:ext cx="13004800" cy="722490"/>
-          </a:xfrm>
-          <a:prstGeom prst="rect">
-            <a:avLst/>
-          </a:prstGeom>
-          <a:ln w="12700">
-            <a:miter lim="400000"/>
-          </a:ln>
-        </p:spPr>
-      </p:pic>
-      <p:pic>
-        <p:nvPicPr>
-          <p:cNvPr id="123" name="pasted-image.pdf"/>
           <p:cNvPicPr>
             <a:picLocks noChangeAspect="1"/>
           </p:cNvPicPr>
@@ -3184,6 +3158,35 @@
         </p:blipFill>
         <p:spPr>
           <a:xfrm>
+            <a:off x="0" y="9036755"/>
+            <a:ext cx="13004800" cy="722490"/>
+          </a:xfrm>
+          <a:prstGeom prst="rect">
+            <a:avLst/>
+          </a:prstGeom>
+          <a:ln w="12700">
+            <a:miter lim="400000"/>
+          </a:ln>
+        </p:spPr>
+      </p:pic>
+      <p:pic>
+        <p:nvPicPr>
+          <p:cNvPr id="123" name="pasted-image.pdf"/>
+          <p:cNvPicPr>
+            <a:picLocks noChangeAspect="1"/>
+          </p:cNvPicPr>
+          <p:nvPr/>
+        </p:nvPicPr>
+        <p:blipFill>
+          <a:blip r:embed="rId6">
+            <a:extLst/>
+          </a:blip>
+          <a:stretch>
+            <a:fillRect/>
+          </a:stretch>
+        </p:blipFill>
+        <p:spPr>
+          <a:xfrm>
             <a:off x="0" y="0"/>
             <a:ext cx="13004800" cy="1219200"/>
           </a:xfrm>
@@ -3204,7 +3207,7 @@
           <p:nvPr/>
         </p:nvPicPr>
         <p:blipFill>
-          <a:blip r:embed="rId6">
+          <a:blip r:embed="rId7">
             <a:extLst/>
           </a:blip>
           <a:stretch>
@@ -4800,9 +4803,9 @@
       </p:par>
     </p:tnLst>
     <p:bldLst>
+      <p:bldP build="whole" bldLvl="1" animBg="1" rev="0" advAuto="0" spid="228" grpId="2"/>
+      <p:bldP build="whole" bldLvl="1" animBg="1" rev="0" advAuto="0" spid="227" grpId="3"/>
       <p:bldP build="whole" bldLvl="1" animBg="1" rev="0" advAuto="0" spid="222" grpId="1"/>
-      <p:bldP build="whole" bldLvl="1" animBg="1" rev="0" advAuto="0" spid="227" grpId="3"/>
-      <p:bldP build="whole" bldLvl="1" animBg="1" rev="0" advAuto="0" spid="228" grpId="2"/>
     </p:bldLst>
   </p:timing>
 </p:sld>

</xml_diff>